<commit_message>
Add labs; update syllabus
</commit_message>
<xml_diff>
--- a/docs/articles/lectures/14_splitplot/figs/factorial.pptx
+++ b/docs/articles/lectures/14_splitplot/figs/factorial.pptx
@@ -6,6 +6,7 @@
   </p:sldMasterIdLst>
   <p:sldIdLst>
     <p:sldId id="256" r:id="rId2"/>
+    <p:sldId id="257" r:id="rId3"/>
   </p:sldIdLst>
   <p:sldSz cx="12192000" cy="6858000"/>
   <p:notesSz cx="6858000" cy="9144000"/>
@@ -4056,32 +4057,29 @@
           <a:lstStyle/>
           <a:p>
             <a:r>
-              <a:rPr lang="en-US" sz="2800" b="1">
+              <a:rPr lang="en-US" sz="2800" b="1" dirty="0">
                 <a:latin typeface="+mj-lt"/>
               </a:rPr>
               <a:t>A</a:t>
             </a:r>
             <a:r>
-              <a:rPr lang="en-US" sz="2800" b="1" baseline="-25000">
+              <a:rPr lang="en-US" sz="2800" b="1" baseline="-25000" dirty="0">
                 <a:latin typeface="+mj-lt"/>
               </a:rPr>
               <a:t>3</a:t>
             </a:r>
             <a:r>
-              <a:rPr lang="en-US" sz="2800" b="1">
+              <a:rPr lang="en-US" sz="2800" b="1" dirty="0">
                 <a:latin typeface="+mj-lt"/>
               </a:rPr>
               <a:t>B</a:t>
             </a:r>
             <a:r>
-              <a:rPr lang="en-US" sz="2800" b="1" baseline="-25000">
+              <a:rPr lang="en-US" sz="2800" b="1" baseline="-25000" dirty="0">
                 <a:latin typeface="+mj-lt"/>
               </a:rPr>
               <a:t>3</a:t>
             </a:r>
-            <a:endParaRPr lang="en-US" sz="2800" b="1" baseline="-25000" dirty="0">
-              <a:latin typeface="+mj-lt"/>
-            </a:endParaRPr>
           </a:p>
         </p:txBody>
       </p:sp>
@@ -4309,6 +4307,946 @@
     <p:extLst>
       <p:ext uri="{BB962C8B-B14F-4D97-AF65-F5344CB8AC3E}">
         <p14:creationId xmlns:p14="http://schemas.microsoft.com/office/powerpoint/2010/main" val="849711895"/>
+      </p:ext>
+    </p:extLst>
+  </p:cSld>
+  <p:clrMapOvr>
+    <a:masterClrMapping/>
+  </p:clrMapOvr>
+</p:sld>
+</file>
+
+<file path=ppt/slides/slide2.xml><?xml version="1.0" encoding="utf-8"?>
+<p:sld xmlns:a="http://schemas.openxmlformats.org/drawingml/2006/main" xmlns:r="http://schemas.openxmlformats.org/officeDocument/2006/relationships" xmlns:p="http://schemas.openxmlformats.org/presentationml/2006/main">
+  <p:cSld>
+    <p:spTree>
+      <p:nvGrpSpPr>
+        <p:cNvPr id="1" name=""/>
+        <p:cNvGrpSpPr/>
+        <p:nvPr/>
+      </p:nvGrpSpPr>
+      <p:grpSpPr>
+        <a:xfrm>
+          <a:off x="0" y="0"/>
+          <a:ext cx="0" cy="0"/>
+          <a:chOff x="0" y="0"/>
+          <a:chExt cx="0" cy="0"/>
+        </a:xfrm>
+      </p:grpSpPr>
+      <p:sp>
+        <p:nvSpPr>
+          <p:cNvPr id="4" name="Rectangle 3">
+            <a:extLst>
+              <a:ext uri="{FF2B5EF4-FFF2-40B4-BE49-F238E27FC236}">
+                <a16:creationId xmlns:a16="http://schemas.microsoft.com/office/drawing/2014/main" id="{AF73A691-DD2D-024F-A77C-6901047EEA68}"/>
+              </a:ext>
+            </a:extLst>
+          </p:cNvPr>
+          <p:cNvSpPr/>
+          <p:nvPr/>
+        </p:nvSpPr>
+        <p:spPr>
+          <a:xfrm>
+            <a:off x="3808209" y="1602889"/>
+            <a:ext cx="4582757" cy="4765638"/>
+          </a:xfrm>
+          <a:prstGeom prst="rect">
+            <a:avLst/>
+          </a:prstGeom>
+          <a:noFill/>
+          <a:ln w="28575">
+            <a:solidFill>
+              <a:schemeClr val="tx1"/>
+            </a:solidFill>
+          </a:ln>
+        </p:spPr>
+        <p:style>
+          <a:lnRef idx="2">
+            <a:schemeClr val="accent1">
+              <a:shade val="50000"/>
+            </a:schemeClr>
+          </a:lnRef>
+          <a:fillRef idx="1">
+            <a:schemeClr val="accent1"/>
+          </a:fillRef>
+          <a:effectRef idx="0">
+            <a:schemeClr val="accent1"/>
+          </a:effectRef>
+          <a:fontRef idx="minor">
+            <a:schemeClr val="lt1"/>
+          </a:fontRef>
+        </p:style>
+        <p:txBody>
+          <a:bodyPr rtlCol="0" anchor="ctr"/>
+          <a:lstStyle/>
+          <a:p>
+            <a:pPr algn="ctr"/>
+            <a:endParaRPr lang="en-US"/>
+          </a:p>
+        </p:txBody>
+      </p:sp>
+      <p:cxnSp>
+        <p:nvCxnSpPr>
+          <p:cNvPr id="6" name="Straight Connector 5">
+            <a:extLst>
+              <a:ext uri="{FF2B5EF4-FFF2-40B4-BE49-F238E27FC236}">
+                <a16:creationId xmlns:a16="http://schemas.microsoft.com/office/drawing/2014/main" id="{B93131C2-9907-FD40-B28E-7670F699B5F6}"/>
+              </a:ext>
+            </a:extLst>
+          </p:cNvPr>
+          <p:cNvCxnSpPr/>
+          <p:nvPr/>
+        </p:nvCxnSpPr>
+        <p:spPr>
+          <a:xfrm>
+            <a:off x="5314281" y="1602889"/>
+            <a:ext cx="0" cy="4765638"/>
+          </a:xfrm>
+          <a:prstGeom prst="line">
+            <a:avLst/>
+          </a:prstGeom>
+          <a:ln w="28575">
+            <a:solidFill>
+              <a:schemeClr val="tx1"/>
+            </a:solidFill>
+          </a:ln>
+        </p:spPr>
+        <p:style>
+          <a:lnRef idx="1">
+            <a:schemeClr val="accent1"/>
+          </a:lnRef>
+          <a:fillRef idx="0">
+            <a:schemeClr val="accent1"/>
+          </a:fillRef>
+          <a:effectRef idx="0">
+            <a:schemeClr val="accent1"/>
+          </a:effectRef>
+          <a:fontRef idx="minor">
+            <a:schemeClr val="tx1"/>
+          </a:fontRef>
+        </p:style>
+      </p:cxnSp>
+      <p:cxnSp>
+        <p:nvCxnSpPr>
+          <p:cNvPr id="7" name="Straight Connector 6">
+            <a:extLst>
+              <a:ext uri="{FF2B5EF4-FFF2-40B4-BE49-F238E27FC236}">
+                <a16:creationId xmlns:a16="http://schemas.microsoft.com/office/drawing/2014/main" id="{C537059E-8F97-0A4E-8457-41B8B6746CC6}"/>
+              </a:ext>
+            </a:extLst>
+          </p:cNvPr>
+          <p:cNvCxnSpPr/>
+          <p:nvPr/>
+        </p:nvCxnSpPr>
+        <p:spPr>
+          <a:xfrm>
+            <a:off x="6929716" y="1602889"/>
+            <a:ext cx="0" cy="4765638"/>
+          </a:xfrm>
+          <a:prstGeom prst="line">
+            <a:avLst/>
+          </a:prstGeom>
+          <a:ln w="28575">
+            <a:solidFill>
+              <a:schemeClr val="tx1"/>
+            </a:solidFill>
+          </a:ln>
+        </p:spPr>
+        <p:style>
+          <a:lnRef idx="1">
+            <a:schemeClr val="accent1"/>
+          </a:lnRef>
+          <a:fillRef idx="0">
+            <a:schemeClr val="accent1"/>
+          </a:fillRef>
+          <a:effectRef idx="0">
+            <a:schemeClr val="accent1"/>
+          </a:effectRef>
+          <a:fontRef idx="minor">
+            <a:schemeClr val="tx1"/>
+          </a:fontRef>
+        </p:style>
+      </p:cxnSp>
+      <p:cxnSp>
+        <p:nvCxnSpPr>
+          <p:cNvPr id="8" name="Straight Connector 7">
+            <a:extLst>
+              <a:ext uri="{FF2B5EF4-FFF2-40B4-BE49-F238E27FC236}">
+                <a16:creationId xmlns:a16="http://schemas.microsoft.com/office/drawing/2014/main" id="{525AAFB2-6DB6-B447-AB19-00D0A782C9FE}"/>
+              </a:ext>
+            </a:extLst>
+          </p:cNvPr>
+          <p:cNvCxnSpPr>
+            <a:cxnSpLocks/>
+            <a:stCxn id="4" idx="1"/>
+            <a:endCxn id="4" idx="3"/>
+          </p:cNvCxnSpPr>
+          <p:nvPr/>
+        </p:nvCxnSpPr>
+        <p:spPr>
+          <a:xfrm>
+            <a:off x="3808209" y="3985708"/>
+            <a:ext cx="4582757" cy="0"/>
+          </a:xfrm>
+          <a:prstGeom prst="line">
+            <a:avLst/>
+          </a:prstGeom>
+          <a:ln w="28575">
+            <a:solidFill>
+              <a:schemeClr val="tx1"/>
+            </a:solidFill>
+          </a:ln>
+        </p:spPr>
+        <p:style>
+          <a:lnRef idx="1">
+            <a:schemeClr val="accent1"/>
+          </a:lnRef>
+          <a:fillRef idx="0">
+            <a:schemeClr val="accent1"/>
+          </a:fillRef>
+          <a:effectRef idx="0">
+            <a:schemeClr val="accent1"/>
+          </a:effectRef>
+          <a:fontRef idx="minor">
+            <a:schemeClr val="tx1"/>
+          </a:fontRef>
+        </p:style>
+      </p:cxnSp>
+      <p:cxnSp>
+        <p:nvCxnSpPr>
+          <p:cNvPr id="11" name="Straight Connector 10">
+            <a:extLst>
+              <a:ext uri="{FF2B5EF4-FFF2-40B4-BE49-F238E27FC236}">
+                <a16:creationId xmlns:a16="http://schemas.microsoft.com/office/drawing/2014/main" id="{7D08615E-77F0-A942-93A8-0224FFFA8F55}"/>
+              </a:ext>
+            </a:extLst>
+          </p:cNvPr>
+          <p:cNvCxnSpPr>
+            <a:cxnSpLocks/>
+          </p:cNvCxnSpPr>
+          <p:nvPr/>
+        </p:nvCxnSpPr>
+        <p:spPr>
+          <a:xfrm>
+            <a:off x="3808209" y="5138570"/>
+            <a:ext cx="4582757" cy="0"/>
+          </a:xfrm>
+          <a:prstGeom prst="line">
+            <a:avLst/>
+          </a:prstGeom>
+          <a:ln w="28575">
+            <a:solidFill>
+              <a:schemeClr val="tx1"/>
+            </a:solidFill>
+          </a:ln>
+        </p:spPr>
+        <p:style>
+          <a:lnRef idx="1">
+            <a:schemeClr val="accent1"/>
+          </a:lnRef>
+          <a:fillRef idx="0">
+            <a:schemeClr val="accent1"/>
+          </a:fillRef>
+          <a:effectRef idx="0">
+            <a:schemeClr val="accent1"/>
+          </a:effectRef>
+          <a:fontRef idx="minor">
+            <a:schemeClr val="tx1"/>
+          </a:fontRef>
+        </p:style>
+      </p:cxnSp>
+      <p:cxnSp>
+        <p:nvCxnSpPr>
+          <p:cNvPr id="12" name="Straight Connector 11">
+            <a:extLst>
+              <a:ext uri="{FF2B5EF4-FFF2-40B4-BE49-F238E27FC236}">
+                <a16:creationId xmlns:a16="http://schemas.microsoft.com/office/drawing/2014/main" id="{280E4BA0-1172-EC4F-9E7D-E26C74841881}"/>
+              </a:ext>
+            </a:extLst>
+          </p:cNvPr>
+          <p:cNvCxnSpPr>
+            <a:cxnSpLocks/>
+          </p:cNvCxnSpPr>
+          <p:nvPr/>
+        </p:nvCxnSpPr>
+        <p:spPr>
+          <a:xfrm>
+            <a:off x="3804621" y="2827468"/>
+            <a:ext cx="4582757" cy="0"/>
+          </a:xfrm>
+          <a:prstGeom prst="line">
+            <a:avLst/>
+          </a:prstGeom>
+          <a:ln w="28575">
+            <a:solidFill>
+              <a:schemeClr val="tx1"/>
+            </a:solidFill>
+          </a:ln>
+        </p:spPr>
+        <p:style>
+          <a:lnRef idx="1">
+            <a:schemeClr val="accent1"/>
+          </a:lnRef>
+          <a:fillRef idx="0">
+            <a:schemeClr val="accent1"/>
+          </a:fillRef>
+          <a:effectRef idx="0">
+            <a:schemeClr val="accent1"/>
+          </a:effectRef>
+          <a:fontRef idx="minor">
+            <a:schemeClr val="tx1"/>
+          </a:fontRef>
+        </p:style>
+      </p:cxnSp>
+      <p:sp>
+        <p:nvSpPr>
+          <p:cNvPr id="13" name="TextBox 12">
+            <a:extLst>
+              <a:ext uri="{FF2B5EF4-FFF2-40B4-BE49-F238E27FC236}">
+                <a16:creationId xmlns:a16="http://schemas.microsoft.com/office/drawing/2014/main" id="{C822F835-F7F7-E743-B48C-3A51B188178E}"/>
+              </a:ext>
+            </a:extLst>
+          </p:cNvPr>
+          <p:cNvSpPr txBox="1"/>
+          <p:nvPr/>
+        </p:nvSpPr>
+        <p:spPr>
+          <a:xfrm>
+            <a:off x="4295681" y="1953569"/>
+            <a:ext cx="498855" cy="523220"/>
+          </a:xfrm>
+          <a:prstGeom prst="rect">
+            <a:avLst/>
+          </a:prstGeom>
+          <a:noFill/>
+        </p:spPr>
+        <p:txBody>
+          <a:bodyPr wrap="none" rtlCol="0">
+            <a:spAutoFit/>
+          </a:bodyPr>
+          <a:lstStyle/>
+          <a:p>
+            <a:r>
+              <a:rPr lang="en-US" sz="2800" b="1" dirty="0">
+                <a:latin typeface="+mj-lt"/>
+              </a:rPr>
+              <a:t>B</a:t>
+            </a:r>
+            <a:r>
+              <a:rPr lang="en-US" sz="2800" b="1" baseline="-25000" dirty="0">
+                <a:latin typeface="+mj-lt"/>
+              </a:rPr>
+              <a:t>1</a:t>
+            </a:r>
+          </a:p>
+        </p:txBody>
+      </p:sp>
+      <p:sp>
+        <p:nvSpPr>
+          <p:cNvPr id="14" name="TextBox 13">
+            <a:extLst>
+              <a:ext uri="{FF2B5EF4-FFF2-40B4-BE49-F238E27FC236}">
+                <a16:creationId xmlns:a16="http://schemas.microsoft.com/office/drawing/2014/main" id="{0639BA92-1C48-574D-9F42-47AF42C2FE2A}"/>
+              </a:ext>
+            </a:extLst>
+          </p:cNvPr>
+          <p:cNvSpPr txBox="1"/>
+          <p:nvPr/>
+        </p:nvSpPr>
+        <p:spPr>
+          <a:xfrm>
+            <a:off x="4295681" y="3106430"/>
+            <a:ext cx="498855" cy="523220"/>
+          </a:xfrm>
+          <a:prstGeom prst="rect">
+            <a:avLst/>
+          </a:prstGeom>
+          <a:noFill/>
+        </p:spPr>
+        <p:txBody>
+          <a:bodyPr wrap="none" rtlCol="0">
+            <a:spAutoFit/>
+          </a:bodyPr>
+          <a:lstStyle/>
+          <a:p>
+            <a:r>
+              <a:rPr lang="en-US" sz="2800" b="1" dirty="0">
+                <a:latin typeface="+mj-lt"/>
+              </a:rPr>
+              <a:t>B</a:t>
+            </a:r>
+            <a:r>
+              <a:rPr lang="en-US" sz="2800" b="1" baseline="-25000" dirty="0">
+                <a:latin typeface="+mj-lt"/>
+              </a:rPr>
+              <a:t>4</a:t>
+            </a:r>
+          </a:p>
+        </p:txBody>
+      </p:sp>
+      <p:sp>
+        <p:nvSpPr>
+          <p:cNvPr id="15" name="TextBox 14">
+            <a:extLst>
+              <a:ext uri="{FF2B5EF4-FFF2-40B4-BE49-F238E27FC236}">
+                <a16:creationId xmlns:a16="http://schemas.microsoft.com/office/drawing/2014/main" id="{F6C98933-25E5-8643-9F81-CD35AE86FF14}"/>
+              </a:ext>
+            </a:extLst>
+          </p:cNvPr>
+          <p:cNvSpPr txBox="1"/>
+          <p:nvPr/>
+        </p:nvSpPr>
+        <p:spPr>
+          <a:xfrm>
+            <a:off x="4295681" y="4259291"/>
+            <a:ext cx="498855" cy="523220"/>
+          </a:xfrm>
+          <a:prstGeom prst="rect">
+            <a:avLst/>
+          </a:prstGeom>
+          <a:noFill/>
+        </p:spPr>
+        <p:txBody>
+          <a:bodyPr wrap="none" rtlCol="0">
+            <a:spAutoFit/>
+          </a:bodyPr>
+          <a:lstStyle/>
+          <a:p>
+            <a:r>
+              <a:rPr lang="en-US" sz="2800" b="1" dirty="0">
+                <a:latin typeface="+mj-lt"/>
+              </a:rPr>
+              <a:t>B</a:t>
+            </a:r>
+            <a:r>
+              <a:rPr lang="en-US" sz="2800" b="1" baseline="-25000" dirty="0">
+                <a:latin typeface="+mj-lt"/>
+              </a:rPr>
+              <a:t>2</a:t>
+            </a:r>
+          </a:p>
+        </p:txBody>
+      </p:sp>
+      <p:sp>
+        <p:nvSpPr>
+          <p:cNvPr id="16" name="TextBox 15">
+            <a:extLst>
+              <a:ext uri="{FF2B5EF4-FFF2-40B4-BE49-F238E27FC236}">
+                <a16:creationId xmlns:a16="http://schemas.microsoft.com/office/drawing/2014/main" id="{46B7B568-5751-8E42-9F69-9EA8B2B26CB4}"/>
+              </a:ext>
+            </a:extLst>
+          </p:cNvPr>
+          <p:cNvSpPr txBox="1"/>
+          <p:nvPr/>
+        </p:nvSpPr>
+        <p:spPr>
+          <a:xfrm>
+            <a:off x="4295681" y="5489249"/>
+            <a:ext cx="498855" cy="523220"/>
+          </a:xfrm>
+          <a:prstGeom prst="rect">
+            <a:avLst/>
+          </a:prstGeom>
+          <a:noFill/>
+        </p:spPr>
+        <p:txBody>
+          <a:bodyPr wrap="none" rtlCol="0">
+            <a:spAutoFit/>
+          </a:bodyPr>
+          <a:lstStyle/>
+          <a:p>
+            <a:r>
+              <a:rPr lang="en-US" sz="2800" b="1" dirty="0">
+                <a:latin typeface="+mj-lt"/>
+              </a:rPr>
+              <a:t>B</a:t>
+            </a:r>
+            <a:r>
+              <a:rPr lang="en-US" sz="2800" b="1" baseline="-25000" dirty="0">
+                <a:latin typeface="+mj-lt"/>
+              </a:rPr>
+              <a:t>3</a:t>
+            </a:r>
+          </a:p>
+        </p:txBody>
+      </p:sp>
+      <p:sp>
+        <p:nvSpPr>
+          <p:cNvPr id="17" name="TextBox 16">
+            <a:extLst>
+              <a:ext uri="{FF2B5EF4-FFF2-40B4-BE49-F238E27FC236}">
+                <a16:creationId xmlns:a16="http://schemas.microsoft.com/office/drawing/2014/main" id="{6C06B9B9-8C1C-614C-938B-AE3D07FADE05}"/>
+              </a:ext>
+            </a:extLst>
+          </p:cNvPr>
+          <p:cNvSpPr txBox="1"/>
+          <p:nvPr/>
+        </p:nvSpPr>
+        <p:spPr>
+          <a:xfrm>
+            <a:off x="5846572" y="1953569"/>
+            <a:ext cx="498855" cy="523220"/>
+          </a:xfrm>
+          <a:prstGeom prst="rect">
+            <a:avLst/>
+          </a:prstGeom>
+          <a:noFill/>
+        </p:spPr>
+        <p:txBody>
+          <a:bodyPr wrap="none" rtlCol="0">
+            <a:spAutoFit/>
+          </a:bodyPr>
+          <a:lstStyle/>
+          <a:p>
+            <a:r>
+              <a:rPr lang="en-US" sz="2800" b="1" dirty="0">
+                <a:latin typeface="+mj-lt"/>
+              </a:rPr>
+              <a:t>B</a:t>
+            </a:r>
+            <a:r>
+              <a:rPr lang="en-US" sz="2800" b="1" baseline="-25000" dirty="0">
+                <a:latin typeface="+mj-lt"/>
+              </a:rPr>
+              <a:t>2</a:t>
+            </a:r>
+          </a:p>
+        </p:txBody>
+      </p:sp>
+      <p:sp>
+        <p:nvSpPr>
+          <p:cNvPr id="18" name="TextBox 17">
+            <a:extLst>
+              <a:ext uri="{FF2B5EF4-FFF2-40B4-BE49-F238E27FC236}">
+                <a16:creationId xmlns:a16="http://schemas.microsoft.com/office/drawing/2014/main" id="{2D251E18-D5BC-664B-BAA8-6AD2D89E51F4}"/>
+              </a:ext>
+            </a:extLst>
+          </p:cNvPr>
+          <p:cNvSpPr txBox="1"/>
+          <p:nvPr/>
+        </p:nvSpPr>
+        <p:spPr>
+          <a:xfrm>
+            <a:off x="5846572" y="3106430"/>
+            <a:ext cx="498855" cy="523220"/>
+          </a:xfrm>
+          <a:prstGeom prst="rect">
+            <a:avLst/>
+          </a:prstGeom>
+          <a:noFill/>
+        </p:spPr>
+        <p:txBody>
+          <a:bodyPr wrap="none" rtlCol="0">
+            <a:spAutoFit/>
+          </a:bodyPr>
+          <a:lstStyle/>
+          <a:p>
+            <a:r>
+              <a:rPr lang="en-US" sz="2800" b="1" dirty="0">
+                <a:latin typeface="+mj-lt"/>
+              </a:rPr>
+              <a:t>B</a:t>
+            </a:r>
+            <a:r>
+              <a:rPr lang="en-US" sz="2800" b="1" baseline="-25000" dirty="0">
+                <a:latin typeface="+mj-lt"/>
+              </a:rPr>
+              <a:t>3</a:t>
+            </a:r>
+          </a:p>
+        </p:txBody>
+      </p:sp>
+      <p:sp>
+        <p:nvSpPr>
+          <p:cNvPr id="19" name="TextBox 18">
+            <a:extLst>
+              <a:ext uri="{FF2B5EF4-FFF2-40B4-BE49-F238E27FC236}">
+                <a16:creationId xmlns:a16="http://schemas.microsoft.com/office/drawing/2014/main" id="{D2B0A6DB-4670-E04E-AC82-5BA68383C161}"/>
+              </a:ext>
+            </a:extLst>
+          </p:cNvPr>
+          <p:cNvSpPr txBox="1"/>
+          <p:nvPr/>
+        </p:nvSpPr>
+        <p:spPr>
+          <a:xfrm>
+            <a:off x="5846572" y="4259291"/>
+            <a:ext cx="498855" cy="523220"/>
+          </a:xfrm>
+          <a:prstGeom prst="rect">
+            <a:avLst/>
+          </a:prstGeom>
+          <a:noFill/>
+        </p:spPr>
+        <p:txBody>
+          <a:bodyPr wrap="none" rtlCol="0">
+            <a:spAutoFit/>
+          </a:bodyPr>
+          <a:lstStyle/>
+          <a:p>
+            <a:r>
+              <a:rPr lang="en-US" sz="2800" b="1" dirty="0">
+                <a:latin typeface="+mj-lt"/>
+              </a:rPr>
+              <a:t>B</a:t>
+            </a:r>
+            <a:r>
+              <a:rPr lang="en-US" sz="2800" b="1" baseline="-25000" dirty="0">
+                <a:latin typeface="+mj-lt"/>
+              </a:rPr>
+              <a:t>1</a:t>
+            </a:r>
+          </a:p>
+        </p:txBody>
+      </p:sp>
+      <p:sp>
+        <p:nvSpPr>
+          <p:cNvPr id="20" name="TextBox 19">
+            <a:extLst>
+              <a:ext uri="{FF2B5EF4-FFF2-40B4-BE49-F238E27FC236}">
+                <a16:creationId xmlns:a16="http://schemas.microsoft.com/office/drawing/2014/main" id="{3EC3011F-231F-094D-A06F-86E5F8C27E12}"/>
+              </a:ext>
+            </a:extLst>
+          </p:cNvPr>
+          <p:cNvSpPr txBox="1"/>
+          <p:nvPr/>
+        </p:nvSpPr>
+        <p:spPr>
+          <a:xfrm>
+            <a:off x="5846572" y="5489249"/>
+            <a:ext cx="498855" cy="523220"/>
+          </a:xfrm>
+          <a:prstGeom prst="rect">
+            <a:avLst/>
+          </a:prstGeom>
+          <a:noFill/>
+        </p:spPr>
+        <p:txBody>
+          <a:bodyPr wrap="none" rtlCol="0">
+            <a:spAutoFit/>
+          </a:bodyPr>
+          <a:lstStyle/>
+          <a:p>
+            <a:r>
+              <a:rPr lang="en-US" sz="2800" b="1" dirty="0">
+                <a:latin typeface="+mj-lt"/>
+              </a:rPr>
+              <a:t>B</a:t>
+            </a:r>
+            <a:r>
+              <a:rPr lang="en-US" sz="2800" b="1" baseline="-25000" dirty="0">
+                <a:latin typeface="+mj-lt"/>
+              </a:rPr>
+              <a:t>4</a:t>
+            </a:r>
+          </a:p>
+        </p:txBody>
+      </p:sp>
+      <p:sp>
+        <p:nvSpPr>
+          <p:cNvPr id="21" name="TextBox 20">
+            <a:extLst>
+              <a:ext uri="{FF2B5EF4-FFF2-40B4-BE49-F238E27FC236}">
+                <a16:creationId xmlns:a16="http://schemas.microsoft.com/office/drawing/2014/main" id="{4BFF6594-8947-024C-BD6B-9988B3570B03}"/>
+              </a:ext>
+            </a:extLst>
+          </p:cNvPr>
+          <p:cNvSpPr txBox="1"/>
+          <p:nvPr/>
+        </p:nvSpPr>
+        <p:spPr>
+          <a:xfrm>
+            <a:off x="7430636" y="1953569"/>
+            <a:ext cx="498855" cy="523220"/>
+          </a:xfrm>
+          <a:prstGeom prst="rect">
+            <a:avLst/>
+          </a:prstGeom>
+          <a:noFill/>
+        </p:spPr>
+        <p:txBody>
+          <a:bodyPr wrap="none" rtlCol="0">
+            <a:spAutoFit/>
+          </a:bodyPr>
+          <a:lstStyle/>
+          <a:p>
+            <a:r>
+              <a:rPr lang="en-US" sz="2800" b="1" dirty="0">
+                <a:latin typeface="+mj-lt"/>
+              </a:rPr>
+              <a:t>B</a:t>
+            </a:r>
+            <a:r>
+              <a:rPr lang="en-US" sz="2800" b="1" baseline="-25000" dirty="0">
+                <a:latin typeface="+mj-lt"/>
+              </a:rPr>
+              <a:t>4</a:t>
+            </a:r>
+          </a:p>
+        </p:txBody>
+      </p:sp>
+      <p:sp>
+        <p:nvSpPr>
+          <p:cNvPr id="22" name="TextBox 21">
+            <a:extLst>
+              <a:ext uri="{FF2B5EF4-FFF2-40B4-BE49-F238E27FC236}">
+                <a16:creationId xmlns:a16="http://schemas.microsoft.com/office/drawing/2014/main" id="{8A97BB8A-FBA1-8544-BCFA-5496C69D20D2}"/>
+              </a:ext>
+            </a:extLst>
+          </p:cNvPr>
+          <p:cNvSpPr txBox="1"/>
+          <p:nvPr/>
+        </p:nvSpPr>
+        <p:spPr>
+          <a:xfrm>
+            <a:off x="7430636" y="3106430"/>
+            <a:ext cx="498855" cy="523220"/>
+          </a:xfrm>
+          <a:prstGeom prst="rect">
+            <a:avLst/>
+          </a:prstGeom>
+          <a:noFill/>
+        </p:spPr>
+        <p:txBody>
+          <a:bodyPr wrap="none" rtlCol="0">
+            <a:spAutoFit/>
+          </a:bodyPr>
+          <a:lstStyle/>
+          <a:p>
+            <a:r>
+              <a:rPr lang="en-US" sz="2800" b="1" dirty="0">
+                <a:latin typeface="+mj-lt"/>
+              </a:rPr>
+              <a:t>B</a:t>
+            </a:r>
+            <a:r>
+              <a:rPr lang="en-US" sz="2800" b="1" baseline="-25000" dirty="0">
+                <a:latin typeface="+mj-lt"/>
+              </a:rPr>
+              <a:t>2</a:t>
+            </a:r>
+          </a:p>
+        </p:txBody>
+      </p:sp>
+      <p:sp>
+        <p:nvSpPr>
+          <p:cNvPr id="23" name="TextBox 22">
+            <a:extLst>
+              <a:ext uri="{FF2B5EF4-FFF2-40B4-BE49-F238E27FC236}">
+                <a16:creationId xmlns:a16="http://schemas.microsoft.com/office/drawing/2014/main" id="{F10DE733-3A5D-BC4B-8CBD-133110743A58}"/>
+              </a:ext>
+            </a:extLst>
+          </p:cNvPr>
+          <p:cNvSpPr txBox="1"/>
+          <p:nvPr/>
+        </p:nvSpPr>
+        <p:spPr>
+          <a:xfrm>
+            <a:off x="7430636" y="4259291"/>
+            <a:ext cx="498855" cy="523220"/>
+          </a:xfrm>
+          <a:prstGeom prst="rect">
+            <a:avLst/>
+          </a:prstGeom>
+          <a:noFill/>
+        </p:spPr>
+        <p:txBody>
+          <a:bodyPr wrap="none" rtlCol="0">
+            <a:spAutoFit/>
+          </a:bodyPr>
+          <a:lstStyle/>
+          <a:p>
+            <a:r>
+              <a:rPr lang="en-US" sz="2800" b="1" dirty="0">
+                <a:latin typeface="+mj-lt"/>
+              </a:rPr>
+              <a:t>B</a:t>
+            </a:r>
+            <a:r>
+              <a:rPr lang="en-US" sz="2800" b="1" baseline="-25000" dirty="0">
+                <a:latin typeface="+mj-lt"/>
+              </a:rPr>
+              <a:t>3</a:t>
+            </a:r>
+          </a:p>
+        </p:txBody>
+      </p:sp>
+      <p:sp>
+        <p:nvSpPr>
+          <p:cNvPr id="24" name="TextBox 23">
+            <a:extLst>
+              <a:ext uri="{FF2B5EF4-FFF2-40B4-BE49-F238E27FC236}">
+                <a16:creationId xmlns:a16="http://schemas.microsoft.com/office/drawing/2014/main" id="{4F06EB2F-EAD9-5E42-AB19-D32C1AAB4DF3}"/>
+              </a:ext>
+            </a:extLst>
+          </p:cNvPr>
+          <p:cNvSpPr txBox="1"/>
+          <p:nvPr/>
+        </p:nvSpPr>
+        <p:spPr>
+          <a:xfrm>
+            <a:off x="7430636" y="5489249"/>
+            <a:ext cx="498855" cy="523220"/>
+          </a:xfrm>
+          <a:prstGeom prst="rect">
+            <a:avLst/>
+          </a:prstGeom>
+          <a:noFill/>
+        </p:spPr>
+        <p:txBody>
+          <a:bodyPr wrap="none" rtlCol="0">
+            <a:spAutoFit/>
+          </a:bodyPr>
+          <a:lstStyle/>
+          <a:p>
+            <a:r>
+              <a:rPr lang="en-US" sz="2800" b="1" dirty="0">
+                <a:latin typeface="+mj-lt"/>
+              </a:rPr>
+              <a:t>B</a:t>
+            </a:r>
+            <a:r>
+              <a:rPr lang="en-US" sz="2800" b="1" baseline="-25000" dirty="0">
+                <a:latin typeface="+mj-lt"/>
+              </a:rPr>
+              <a:t>1</a:t>
+            </a:r>
+          </a:p>
+        </p:txBody>
+      </p:sp>
+      <p:sp>
+        <p:nvSpPr>
+          <p:cNvPr id="25" name="TextBox 24">
+            <a:extLst>
+              <a:ext uri="{FF2B5EF4-FFF2-40B4-BE49-F238E27FC236}">
+                <a16:creationId xmlns:a16="http://schemas.microsoft.com/office/drawing/2014/main" id="{195386C5-3C89-1045-803E-34391F451186}"/>
+              </a:ext>
+            </a:extLst>
+          </p:cNvPr>
+          <p:cNvSpPr txBox="1"/>
+          <p:nvPr/>
+        </p:nvSpPr>
+        <p:spPr>
+          <a:xfrm>
+            <a:off x="4295681" y="851230"/>
+            <a:ext cx="599844" cy="646331"/>
+          </a:xfrm>
+          <a:prstGeom prst="rect">
+            <a:avLst/>
+          </a:prstGeom>
+          <a:noFill/>
+        </p:spPr>
+        <p:txBody>
+          <a:bodyPr wrap="none" rtlCol="0">
+            <a:spAutoFit/>
+          </a:bodyPr>
+          <a:lstStyle/>
+          <a:p>
+            <a:r>
+              <a:rPr lang="en-US" sz="3600" b="1" dirty="0">
+                <a:latin typeface="+mj-lt"/>
+              </a:rPr>
+              <a:t>A</a:t>
+            </a:r>
+            <a:r>
+              <a:rPr lang="en-US" sz="3600" b="1" baseline="-25000" dirty="0">
+                <a:latin typeface="+mj-lt"/>
+              </a:rPr>
+              <a:t>1</a:t>
+            </a:r>
+          </a:p>
+        </p:txBody>
+      </p:sp>
+      <p:sp>
+        <p:nvSpPr>
+          <p:cNvPr id="26" name="TextBox 25">
+            <a:extLst>
+              <a:ext uri="{FF2B5EF4-FFF2-40B4-BE49-F238E27FC236}">
+                <a16:creationId xmlns:a16="http://schemas.microsoft.com/office/drawing/2014/main" id="{2E7CB03F-0767-C441-B1AD-965B6585849B}"/>
+              </a:ext>
+            </a:extLst>
+          </p:cNvPr>
+          <p:cNvSpPr txBox="1"/>
+          <p:nvPr/>
+        </p:nvSpPr>
+        <p:spPr>
+          <a:xfrm>
+            <a:off x="5846572" y="851230"/>
+            <a:ext cx="599844" cy="646331"/>
+          </a:xfrm>
+          <a:prstGeom prst="rect">
+            <a:avLst/>
+          </a:prstGeom>
+          <a:noFill/>
+        </p:spPr>
+        <p:txBody>
+          <a:bodyPr wrap="none" rtlCol="0">
+            <a:spAutoFit/>
+          </a:bodyPr>
+          <a:lstStyle/>
+          <a:p>
+            <a:r>
+              <a:rPr lang="en-US" sz="3600" b="1" dirty="0">
+                <a:latin typeface="+mj-lt"/>
+              </a:rPr>
+              <a:t>A</a:t>
+            </a:r>
+            <a:r>
+              <a:rPr lang="en-US" sz="3600" b="1" baseline="-25000" dirty="0">
+                <a:latin typeface="+mj-lt"/>
+              </a:rPr>
+              <a:t>2</a:t>
+            </a:r>
+          </a:p>
+        </p:txBody>
+      </p:sp>
+      <p:sp>
+        <p:nvSpPr>
+          <p:cNvPr id="27" name="TextBox 26">
+            <a:extLst>
+              <a:ext uri="{FF2B5EF4-FFF2-40B4-BE49-F238E27FC236}">
+                <a16:creationId xmlns:a16="http://schemas.microsoft.com/office/drawing/2014/main" id="{2AECB110-F798-6A41-8E19-4E6AD839F2D2}"/>
+              </a:ext>
+            </a:extLst>
+          </p:cNvPr>
+          <p:cNvSpPr txBox="1"/>
+          <p:nvPr/>
+        </p:nvSpPr>
+        <p:spPr>
+          <a:xfrm>
+            <a:off x="7430636" y="851230"/>
+            <a:ext cx="599844" cy="646331"/>
+          </a:xfrm>
+          <a:prstGeom prst="rect">
+            <a:avLst/>
+          </a:prstGeom>
+          <a:noFill/>
+        </p:spPr>
+        <p:txBody>
+          <a:bodyPr wrap="none" rtlCol="0">
+            <a:spAutoFit/>
+          </a:bodyPr>
+          <a:lstStyle/>
+          <a:p>
+            <a:r>
+              <a:rPr lang="en-US" sz="3600" b="1" dirty="0">
+                <a:latin typeface="+mj-lt"/>
+              </a:rPr>
+              <a:t>A</a:t>
+            </a:r>
+            <a:r>
+              <a:rPr lang="en-US" sz="3600" b="1" baseline="-25000" dirty="0">
+                <a:latin typeface="+mj-lt"/>
+              </a:rPr>
+              <a:t>3</a:t>
+            </a:r>
+          </a:p>
+        </p:txBody>
+      </p:sp>
+    </p:spTree>
+    <p:extLst>
+      <p:ext uri="{BB962C8B-B14F-4D97-AF65-F5344CB8AC3E}">
+        <p14:creationId xmlns:p14="http://schemas.microsoft.com/office/powerpoint/2010/main" val="540636743"/>
       </p:ext>
     </p:extLst>
   </p:cSld>

</xml_diff>